<commit_message>
Update Discussão das Normas ISO 12300 e 21564.pptx
</commit_message>
<xml_diff>
--- a/Documentos/Normas-ISO/Discussão das Normas ISO 12300 e 21564.pptx
+++ b/Documentos/Normas-ISO/Discussão das Normas ISO 12300 e 21564.pptx
@@ -272,7 +272,7 @@
           <a:p>
             <a:fld id="{97B75058-D080-F34F-8E7E-A909663E38ED}" type="datetimeFigureOut">
               <a:rPr lang="en-US" smtClean="0"/>
-              <a:t>3/1/2023</a:t>
+              <a:t>3/7/2023</a:t>
             </a:fld>
             <a:endParaRPr lang="en-US"/>
           </a:p>
@@ -480,7 +480,7 @@
           <a:p>
             <a:fld id="{97B75058-D080-F34F-8E7E-A909663E38ED}" type="datetimeFigureOut">
               <a:rPr lang="en-US" smtClean="0"/>
-              <a:t>3/1/2023</a:t>
+              <a:t>3/7/2023</a:t>
             </a:fld>
             <a:endParaRPr lang="en-US"/>
           </a:p>
@@ -734,7 +734,7 @@
           <a:p>
             <a:fld id="{97B75058-D080-F34F-8E7E-A909663E38ED}" type="datetimeFigureOut">
               <a:rPr lang="en-US" smtClean="0"/>
-              <a:t>3/1/2023</a:t>
+              <a:t>3/7/2023</a:t>
             </a:fld>
             <a:endParaRPr lang="en-US"/>
           </a:p>
@@ -1002,7 +1002,7 @@
           <a:p>
             <a:fld id="{97B75058-D080-F34F-8E7E-A909663E38ED}" type="datetimeFigureOut">
               <a:rPr lang="en-US" smtClean="0"/>
-              <a:t>3/1/2023</a:t>
+              <a:t>3/7/2023</a:t>
             </a:fld>
             <a:endParaRPr lang="en-US"/>
           </a:p>
@@ -1307,7 +1307,7 @@
           <a:p>
             <a:fld id="{97B75058-D080-F34F-8E7E-A909663E38ED}" type="datetimeFigureOut">
               <a:rPr lang="en-US" smtClean="0"/>
-              <a:t>3/1/2023</a:t>
+              <a:t>3/7/2023</a:t>
             </a:fld>
             <a:endParaRPr lang="en-US"/>
           </a:p>
@@ -1604,7 +1604,7 @@
           <a:p>
             <a:fld id="{97B75058-D080-F34F-8E7E-A909663E38ED}" type="datetimeFigureOut">
               <a:rPr lang="en-US" smtClean="0"/>
-              <a:t>3/1/2023</a:t>
+              <a:t>3/7/2023</a:t>
             </a:fld>
             <a:endParaRPr lang="en-US"/>
           </a:p>
@@ -2037,7 +2037,7 @@
           <a:p>
             <a:fld id="{97B75058-D080-F34F-8E7E-A909663E38ED}" type="datetimeFigureOut">
               <a:rPr lang="en-US" smtClean="0"/>
-              <a:t>3/1/2023</a:t>
+              <a:t>3/7/2023</a:t>
             </a:fld>
             <a:endParaRPr lang="en-US"/>
           </a:p>
@@ -2216,7 +2216,7 @@
           <a:p>
             <a:fld id="{97B75058-D080-F34F-8E7E-A909663E38ED}" type="datetimeFigureOut">
               <a:rPr lang="en-US" smtClean="0"/>
-              <a:t>3/1/2023</a:t>
+              <a:t>3/7/2023</a:t>
             </a:fld>
             <a:endParaRPr lang="en-US"/>
           </a:p>
@@ -2365,7 +2365,7 @@
           <a:p>
             <a:fld id="{97B75058-D080-F34F-8E7E-A909663E38ED}" type="datetimeFigureOut">
               <a:rPr lang="en-US" smtClean="0"/>
-              <a:t>3/1/2023</a:t>
+              <a:t>3/7/2023</a:t>
             </a:fld>
             <a:endParaRPr lang="en-US"/>
           </a:p>
@@ -2749,7 +2749,7 @@
           <a:p>
             <a:fld id="{97B75058-D080-F34F-8E7E-A909663E38ED}" type="datetimeFigureOut">
               <a:rPr lang="en-US" smtClean="0"/>
-              <a:t>3/1/2023</a:t>
+              <a:t>3/7/2023</a:t>
             </a:fld>
             <a:endParaRPr lang="en-US"/>
           </a:p>
@@ -3110,7 +3110,7 @@
           <a:p>
             <a:fld id="{97B75058-D080-F34F-8E7E-A909663E38ED}" type="datetimeFigureOut">
               <a:rPr lang="en-US" smtClean="0"/>
-              <a:t>3/1/2023</a:t>
+              <a:t>3/7/2023</a:t>
             </a:fld>
             <a:endParaRPr lang="en-US"/>
           </a:p>
@@ -8735,13 +8735,6 @@
               </a:rPr>
               <a:t>	23903 - Health informatics — Interoperability and Integration Reference Architecture – Model and Framework</a:t>
             </a:r>
-            <a:endParaRPr lang="en-US" b="1" dirty="0">
-              <a:solidFill>
-                <a:schemeClr val="bg1"/>
-              </a:solidFill>
-              <a:ea typeface="Verdana" panose="020B0604030504040204" pitchFamily="34" charset="0"/>
-              <a:cs typeface="Verdana" charset="0"/>
-            </a:endParaRPr>
           </a:p>
         </p:txBody>
       </p:sp>
@@ -9917,7 +9910,7 @@
         </p:nvGraphicFramePr>
         <p:xfrm>
           <a:off x="2345195" y="2124418"/>
-          <a:ext cx="7097743" cy="4135501"/>
+          <a:ext cx="7097743" cy="4461759"/>
         </p:xfrm>
         <a:graphic>
           <a:graphicData uri="http://schemas.openxmlformats.org/drawingml/2006/table">
@@ -11579,8 +11572,8 @@
         </p:nvSpPr>
         <p:spPr>
           <a:xfrm>
-            <a:off x="2345195" y="6259919"/>
-            <a:ext cx="1752403" cy="261610"/>
+            <a:off x="2274856" y="6577181"/>
+            <a:ext cx="1314784" cy="215444"/>
           </a:xfrm>
           <a:prstGeom prst="rect">
             <a:avLst/>
@@ -11593,7 +11586,7 @@
           <a:lstStyle/>
           <a:p>
             <a:r>
-              <a:rPr lang="pt-BR" sz="1100" dirty="0">
+              <a:rPr lang="pt-BR" sz="800" dirty="0">
                 <a:solidFill>
                   <a:schemeClr val="bg2">
                     <a:lumMod val="10000"/>
@@ -11605,7 +11598,7 @@
               </a:rPr>
               <a:t>Fonte: ABNT ISO/TR 12300 </a:t>
             </a:r>
-            <a:endParaRPr lang="pt-BR" sz="1100" dirty="0"/>
+            <a:endParaRPr lang="pt-BR" sz="800" dirty="0"/>
           </a:p>
         </p:txBody>
       </p:sp>
@@ -13281,7 +13274,7 @@
         <p:spPr>
           <a:xfrm>
             <a:off x="1277962" y="6056888"/>
-            <a:ext cx="1857816" cy="276999"/>
+            <a:ext cx="1292341" cy="215444"/>
           </a:xfrm>
           <a:prstGeom prst="rect">
             <a:avLst/>
@@ -13294,7 +13287,7 @@
           <a:lstStyle/>
           <a:p>
             <a:r>
-              <a:rPr lang="pt-BR" sz="1200" dirty="0">
+              <a:rPr lang="pt-BR" sz="800" dirty="0">
                 <a:solidFill>
                   <a:srgbClr val="2E2502"/>
                 </a:solidFill>
@@ -13304,7 +13297,7 @@
               </a:rPr>
               <a:t>Fonte: ABNT ISO/TR 12300</a:t>
             </a:r>
-            <a:endParaRPr lang="pt-BR" sz="1200" dirty="0"/>
+            <a:endParaRPr lang="pt-BR" sz="800" dirty="0"/>
           </a:p>
         </p:txBody>
       </p:sp>
@@ -13799,11 +13792,6 @@
               </a:rPr>
               <a:t>Cardinalidade do mapeamento</a:t>
             </a:r>
-            <a:endParaRPr lang="pt-BR" dirty="0">
-              <a:solidFill>
-                <a:srgbClr val="2E2502"/>
-              </a:solidFill>
-            </a:endParaRPr>
           </a:p>
         </p:txBody>
       </p:sp>
@@ -13816,7 +13804,7 @@
         <p:spPr>
           <a:xfrm>
             <a:off x="1277962" y="5946015"/>
-            <a:ext cx="1857816" cy="276999"/>
+            <a:ext cx="1292341" cy="215444"/>
           </a:xfrm>
           <a:prstGeom prst="rect">
             <a:avLst/>
@@ -13829,7 +13817,7 @@
           <a:lstStyle/>
           <a:p>
             <a:r>
-              <a:rPr lang="pt-BR" sz="1200" dirty="0">
+              <a:rPr lang="pt-BR" sz="800" dirty="0">
                 <a:solidFill>
                   <a:srgbClr val="2E2502"/>
                 </a:solidFill>
@@ -13839,7 +13827,7 @@
               </a:rPr>
               <a:t>Fonte: ABNT ISO/TR 12300</a:t>
             </a:r>
-            <a:endParaRPr lang="pt-BR" sz="1200" dirty="0"/>
+            <a:endParaRPr lang="pt-BR" sz="800" dirty="0"/>
           </a:p>
         </p:txBody>
       </p:sp>
@@ -15486,7 +15474,37 @@
                 <a:ea typeface="Times New Roman" panose="02020603050405020304" pitchFamily="18" charset="0"/>
                 <a:cs typeface="Calibri" panose="020F0502020204030204" pitchFamily="34" charset="0"/>
               </a:rPr>
-              <a:t>e essas decisões afetam a escolha do resultado do mapeamento individual de um código-fonte para um código-alvo. Quando o objetivo muda, o resultado também pode precisar ser diferente.</a:t>
+              <a:t>e essas decisões afetam a escolha do resultado do mapeamento individual de um código-fonte para um código-alvo. Quando o objetivo muda, o resultado também </a:t>
+            </a:r>
+            <a:r>
+              <a:rPr lang="pt-PT" altLang="pt-BR" sz="1600">
+                <a:solidFill>
+                  <a:srgbClr val="202124"/>
+                </a:solidFill>
+                <a:ea typeface="Times New Roman" panose="02020603050405020304" pitchFamily="18" charset="0"/>
+                <a:cs typeface="Calibri" panose="020F0502020204030204" pitchFamily="34" charset="0"/>
+              </a:rPr>
+              <a:t>pode </a:t>
+            </a:r>
+            <a:r>
+              <a:rPr lang="pt-PT" altLang="pt-BR" sz="1600" smtClean="0">
+                <a:solidFill>
+                  <a:srgbClr val="202124"/>
+                </a:solidFill>
+                <a:ea typeface="Times New Roman" panose="02020603050405020304" pitchFamily="18" charset="0"/>
+                <a:cs typeface="Calibri" panose="020F0502020204030204" pitchFamily="34" charset="0"/>
+              </a:rPr>
+              <a:t>ser </a:t>
+            </a:r>
+            <a:r>
+              <a:rPr lang="pt-PT" altLang="pt-BR" sz="1600" dirty="0">
+                <a:solidFill>
+                  <a:srgbClr val="202124"/>
+                </a:solidFill>
+                <a:ea typeface="Times New Roman" panose="02020603050405020304" pitchFamily="18" charset="0"/>
+                <a:cs typeface="Calibri" panose="020F0502020204030204" pitchFamily="34" charset="0"/>
+              </a:rPr>
+              <a:t>diferente.</a:t>
             </a:r>
           </a:p>
           <a:p>
@@ -15988,15 +16006,6 @@
 </file>
 
 <file path=customXml/item1.xml><?xml version="1.0" encoding="utf-8"?>
-<p:properties xmlns:p="http://schemas.microsoft.com/office/2006/metadata/properties" xmlns:xsi="http://www.w3.org/2001/XMLSchema-instance" xmlns:pc="http://schemas.microsoft.com/office/infopath/2007/PartnerControls">
-  <documentManagement>
-    <PublishingExpirationDate xmlns="http://schemas.microsoft.com/sharepoint/v3" xsi:nil="true"/>
-    <PublishingStartDate xmlns="http://schemas.microsoft.com/sharepoint/v3" xsi:nil="true"/>
-  </documentManagement>
-</p:properties>
-</file>
-
-<file path=customXml/item2.xml><?xml version="1.0" encoding="utf-8"?>
 <ct:contentTypeSchema xmlns:ct="http://schemas.microsoft.com/office/2006/metadata/contentType" xmlns:ma="http://schemas.microsoft.com/office/2006/metadata/properties/metaAttributes" ct:_="" ma:_="" ma:contentTypeName="Documento" ma:contentTypeID="0x010100723D2CAF8F6D454386B6D2F8A0DCF231" ma:contentTypeVersion="2" ma:contentTypeDescription="Crie um novo documento." ma:contentTypeScope="" ma:versionID="c0858f29dd66d52c8696a7587490b468">
   <xsd:schema xmlns:xsd="http://www.w3.org/2001/XMLSchema" xmlns:xs="http://www.w3.org/2001/XMLSchema" xmlns:p="http://schemas.microsoft.com/office/2006/metadata/properties" xmlns:ns1="http://schemas.microsoft.com/sharepoint/v3" targetNamespace="http://schemas.microsoft.com/office/2006/metadata/properties" ma:root="true" ma:fieldsID="b1e67541914f58e7f62cd871ab279784" ns1:_="">
     <xsd:import namespace="http://schemas.microsoft.com/sharepoint/v3"/>
@@ -16128,6 +16137,15 @@
 </ct:contentTypeSchema>
 </file>
 
+<file path=customXml/item2.xml><?xml version="1.0" encoding="utf-8"?>
+<p:properties xmlns:p="http://schemas.microsoft.com/office/2006/metadata/properties" xmlns:xsi="http://www.w3.org/2001/XMLSchema-instance" xmlns:pc="http://schemas.microsoft.com/office/infopath/2007/PartnerControls">
+  <documentManagement>
+    <PublishingExpirationDate xmlns="http://schemas.microsoft.com/sharepoint/v3" xsi:nil="true"/>
+    <PublishingStartDate xmlns="http://schemas.microsoft.com/sharepoint/v3" xsi:nil="true"/>
+  </documentManagement>
+</p:properties>
+</file>
+
 <file path=customXml/item3.xml><?xml version="1.0" encoding="utf-8"?>
 <?mso-contentType ?>
 <FormTemplates xmlns="http://schemas.microsoft.com/sharepoint/v3/contenttype/forms">
@@ -16138,22 +16156,6 @@
 </file>
 
 <file path=customXml/itemProps1.xml><?xml version="1.0" encoding="utf-8"?>
-<ds:datastoreItem xmlns:ds="http://schemas.openxmlformats.org/officeDocument/2006/customXml" ds:itemID="{5F17BE90-3239-45E4-8E7C-04C1ECDC6112}">
-  <ds:schemaRefs>
-    <ds:schemaRef ds:uri="http://purl.org/dc/terms/"/>
-    <ds:schemaRef ds:uri="http://purl.org/dc/elements/1.1/"/>
-    <ds:schemaRef ds:uri="http://schemas.openxmlformats.org/package/2006/metadata/core-properties"/>
-    <ds:schemaRef ds:uri="http://schemas.microsoft.com/office/2006/documentManagement/types"/>
-    <ds:schemaRef ds:uri="http://schemas.microsoft.com/sharepoint/v3"/>
-    <ds:schemaRef ds:uri="http://purl.org/dc/dcmitype/"/>
-    <ds:schemaRef ds:uri="http://www.w3.org/XML/1998/namespace"/>
-    <ds:schemaRef ds:uri="http://schemas.microsoft.com/office/infopath/2007/PartnerControls"/>
-    <ds:schemaRef ds:uri="http://schemas.microsoft.com/office/2006/metadata/properties"/>
-  </ds:schemaRefs>
-</ds:datastoreItem>
-</file>
-
-<file path=customXml/itemProps2.xml><?xml version="1.0" encoding="utf-8"?>
 <ds:datastoreItem xmlns:ds="http://schemas.openxmlformats.org/officeDocument/2006/customXml" ds:itemID="{C4046F3B-6BA2-4AF8-9DF3-38A821388055}">
   <ds:schemaRefs>
     <ds:schemaRef ds:uri="http://schemas.microsoft.com/office/2006/metadata/contentType"/>
@@ -16171,6 +16173,22 @@
 </ds:datastoreItem>
 </file>
 
+<file path=customXml/itemProps2.xml><?xml version="1.0" encoding="utf-8"?>
+<ds:datastoreItem xmlns:ds="http://schemas.openxmlformats.org/officeDocument/2006/customXml" ds:itemID="{5F17BE90-3239-45E4-8E7C-04C1ECDC6112}">
+  <ds:schemaRefs>
+    <ds:schemaRef ds:uri="http://purl.org/dc/terms/"/>
+    <ds:schemaRef ds:uri="http://purl.org/dc/elements/1.1/"/>
+    <ds:schemaRef ds:uri="http://schemas.openxmlformats.org/package/2006/metadata/core-properties"/>
+    <ds:schemaRef ds:uri="http://schemas.microsoft.com/office/2006/documentManagement/types"/>
+    <ds:schemaRef ds:uri="http://schemas.microsoft.com/sharepoint/v3"/>
+    <ds:schemaRef ds:uri="http://purl.org/dc/dcmitype/"/>
+    <ds:schemaRef ds:uri="http://www.w3.org/XML/1998/namespace"/>
+    <ds:schemaRef ds:uri="http://schemas.microsoft.com/office/infopath/2007/PartnerControls"/>
+    <ds:schemaRef ds:uri="http://schemas.microsoft.com/office/2006/metadata/properties"/>
+  </ds:schemaRefs>
+</ds:datastoreItem>
+</file>
+
 <file path=customXml/itemProps3.xml><?xml version="1.0" encoding="utf-8"?>
 <ds:datastoreItem xmlns:ds="http://schemas.openxmlformats.org/officeDocument/2006/customXml" ds:itemID="{F6787597-DDBA-41B4-A0C3-4E2D2241CA34}">
   <ds:schemaRefs>

</xml_diff>